<commit_message>
coathor reviews complete, may need a few formatting tweaks
</commit_message>
<xml_diff>
--- a/img/CPG_tool_structure.pptx
+++ b/img/CPG_tool_structure.pptx
@@ -104,6 +104,11 @@
       </a:defRPr>
     </a:lvl9pPr>
   </p:defaultTextStyle>
+  <p:extLst>
+    <p:ext uri="{EFAFB233-063F-42B5-8137-9DF3F51BA10A}">
+      <p15:sldGuideLst xmlns:p15="http://schemas.microsoft.com/office/powerpoint/2012/main"/>
+    </p:ext>
+  </p:extLst>
 </p:presentation>
 </file>
 
@@ -254,7 +259,7 @@
           <a:p>
             <a:fld id="{9E5CB6FE-868D-4650-8B01-155A28A9E34A}" type="datetimeFigureOut">
               <a:rPr lang="en-US" smtClean="0"/>
-              <a:t>5/10/2019</a:t>
+              <a:t>5/19/2020</a:t>
             </a:fld>
             <a:endParaRPr lang="en-US" dirty="0"/>
           </a:p>
@@ -452,7 +457,7 @@
           <a:p>
             <a:fld id="{9E5CB6FE-868D-4650-8B01-155A28A9E34A}" type="datetimeFigureOut">
               <a:rPr lang="en-US" smtClean="0"/>
-              <a:t>5/10/2019</a:t>
+              <a:t>5/19/2020</a:t>
             </a:fld>
             <a:endParaRPr lang="en-US" dirty="0"/>
           </a:p>
@@ -660,7 +665,7 @@
           <a:p>
             <a:fld id="{9E5CB6FE-868D-4650-8B01-155A28A9E34A}" type="datetimeFigureOut">
               <a:rPr lang="en-US" smtClean="0"/>
-              <a:t>5/10/2019</a:t>
+              <a:t>5/19/2020</a:t>
             </a:fld>
             <a:endParaRPr lang="en-US" dirty="0"/>
           </a:p>
@@ -858,7 +863,7 @@
           <a:p>
             <a:fld id="{9E5CB6FE-868D-4650-8B01-155A28A9E34A}" type="datetimeFigureOut">
               <a:rPr lang="en-US" smtClean="0"/>
-              <a:t>5/10/2019</a:t>
+              <a:t>5/19/2020</a:t>
             </a:fld>
             <a:endParaRPr lang="en-US" dirty="0"/>
           </a:p>
@@ -1133,7 +1138,7 @@
           <a:p>
             <a:fld id="{9E5CB6FE-868D-4650-8B01-155A28A9E34A}" type="datetimeFigureOut">
               <a:rPr lang="en-US" smtClean="0"/>
-              <a:t>5/10/2019</a:t>
+              <a:t>5/19/2020</a:t>
             </a:fld>
             <a:endParaRPr lang="en-US" dirty="0"/>
           </a:p>
@@ -1398,7 +1403,7 @@
           <a:p>
             <a:fld id="{9E5CB6FE-868D-4650-8B01-155A28A9E34A}" type="datetimeFigureOut">
               <a:rPr lang="en-US" smtClean="0"/>
-              <a:t>5/10/2019</a:t>
+              <a:t>5/19/2020</a:t>
             </a:fld>
             <a:endParaRPr lang="en-US" dirty="0"/>
           </a:p>
@@ -1810,7 +1815,7 @@
           <a:p>
             <a:fld id="{9E5CB6FE-868D-4650-8B01-155A28A9E34A}" type="datetimeFigureOut">
               <a:rPr lang="en-US" smtClean="0"/>
-              <a:t>5/10/2019</a:t>
+              <a:t>5/19/2020</a:t>
             </a:fld>
             <a:endParaRPr lang="en-US" dirty="0"/>
           </a:p>
@@ -1951,7 +1956,7 @@
           <a:p>
             <a:fld id="{9E5CB6FE-868D-4650-8B01-155A28A9E34A}" type="datetimeFigureOut">
               <a:rPr lang="en-US" smtClean="0"/>
-              <a:t>5/10/2019</a:t>
+              <a:t>5/19/2020</a:t>
             </a:fld>
             <a:endParaRPr lang="en-US" dirty="0"/>
           </a:p>
@@ -2064,7 +2069,7 @@
           <a:p>
             <a:fld id="{9E5CB6FE-868D-4650-8B01-155A28A9E34A}" type="datetimeFigureOut">
               <a:rPr lang="en-US" smtClean="0"/>
-              <a:t>5/10/2019</a:t>
+              <a:t>5/19/2020</a:t>
             </a:fld>
             <a:endParaRPr lang="en-US" dirty="0"/>
           </a:p>
@@ -2375,7 +2380,7 @@
           <a:p>
             <a:fld id="{9E5CB6FE-868D-4650-8B01-155A28A9E34A}" type="datetimeFigureOut">
               <a:rPr lang="en-US" smtClean="0"/>
-              <a:t>5/10/2019</a:t>
+              <a:t>5/19/2020</a:t>
             </a:fld>
             <a:endParaRPr lang="en-US" dirty="0"/>
           </a:p>
@@ -2663,7 +2668,7 @@
           <a:p>
             <a:fld id="{9E5CB6FE-868D-4650-8B01-155A28A9E34A}" type="datetimeFigureOut">
               <a:rPr lang="en-US" smtClean="0"/>
-              <a:t>5/10/2019</a:t>
+              <a:t>5/19/2020</a:t>
             </a:fld>
             <a:endParaRPr lang="en-US" dirty="0"/>
           </a:p>
@@ -2904,7 +2909,7 @@
           <a:p>
             <a:fld id="{9E5CB6FE-868D-4650-8B01-155A28A9E34A}" type="datetimeFigureOut">
               <a:rPr lang="en-US" smtClean="0"/>
-              <a:t>5/10/2019</a:t>
+              <a:t>5/19/2020</a:t>
             </a:fld>
             <a:endParaRPr lang="en-US" dirty="0"/>
           </a:p>
@@ -3335,8 +3340,8 @@
         </p:nvSpPr>
         <p:spPr>
           <a:xfrm>
-            <a:off x="8994707" y="3900196"/>
-            <a:ext cx="1380930" cy="905069"/>
+            <a:off x="9209311" y="4194105"/>
+            <a:ext cx="2108719" cy="611160"/>
           </a:xfrm>
           <a:prstGeom prst="roundRect">
             <a:avLst/>
@@ -3368,6 +3373,17 @@
               <a:t>CPG Engine</a:t>
             </a:r>
           </a:p>
+          <a:p>
+            <a:pPr algn="ctr"/>
+            <a:r>
+              <a:rPr lang="en-US" i="1" dirty="0" err="1"/>
+              <a:t>make_fcpg</a:t>
+            </a:r>
+            <a:r>
+              <a:rPr lang="en-US" i="1" dirty="0"/>
+              <a:t>()</a:t>
+            </a:r>
+          </a:p>
         </p:txBody>
       </p:sp>
       <p:sp>
@@ -3384,8 +3400,8 @@
         </p:nvSpPr>
         <p:spPr>
           <a:xfrm>
-            <a:off x="8630813" y="2439953"/>
-            <a:ext cx="2108719" cy="998376"/>
+            <a:off x="9158774" y="1880881"/>
+            <a:ext cx="2108719" cy="667140"/>
           </a:xfrm>
           <a:prstGeom prst="roundRect">
             <a:avLst/>
@@ -3417,6 +3433,17 @@
               <a:t>Clip and Resample</a:t>
             </a:r>
           </a:p>
+          <a:p>
+            <a:pPr algn="ctr"/>
+            <a:r>
+              <a:rPr lang="en-US" i="1" dirty="0" err="1"/>
+              <a:t>resampleParam</a:t>
+            </a:r>
+            <a:r>
+              <a:rPr lang="en-US" i="1" dirty="0"/>
+              <a:t>()</a:t>
+            </a:r>
+          </a:p>
         </p:txBody>
       </p:sp>
       <p:sp>
@@ -3433,7 +3460,7 @@
         </p:nvSpPr>
         <p:spPr>
           <a:xfrm>
-            <a:off x="9395923" y="3484984"/>
+            <a:off x="9974421" y="3772288"/>
             <a:ext cx="578498" cy="382555"/>
           </a:xfrm>
           <a:prstGeom prst="downArrow">
@@ -3479,8 +3506,8 @@
         </p:nvSpPr>
         <p:spPr>
           <a:xfrm>
-            <a:off x="6721158" y="349898"/>
-            <a:ext cx="1713723" cy="998376"/>
+            <a:off x="8995487" y="357931"/>
+            <a:ext cx="2435289" cy="998376"/>
           </a:xfrm>
           <a:prstGeom prst="roundRect">
             <a:avLst/>
@@ -3512,6 +3539,13 @@
               <a:t>Continuous Variables</a:t>
             </a:r>
           </a:p>
+          <a:p>
+            <a:pPr algn="ctr"/>
+            <a:r>
+              <a:rPr lang="en-US" dirty="0"/>
+              <a:t>(e.g. precipitation)</a:t>
+            </a:r>
+          </a:p>
         </p:txBody>
       </p:sp>
       <p:sp>
@@ -3528,8 +3562,8 @@
         </p:nvSpPr>
         <p:spPr>
           <a:xfrm>
-            <a:off x="4923469" y="342127"/>
-            <a:ext cx="1713723" cy="998376"/>
+            <a:off x="4720523" y="258161"/>
+            <a:ext cx="1924435" cy="998376"/>
           </a:xfrm>
           <a:prstGeom prst="roundRect">
             <a:avLst/>
@@ -3561,14 +3595,21 @@
               <a:t>Discrete Variables</a:t>
             </a:r>
           </a:p>
-        </p:txBody>
-      </p:sp>
-      <p:sp>
-        <p:nvSpPr>
-          <p:cNvPr id="10" name="Rectangle: Rounded Corners 9">
-            <a:extLst>
-              <a:ext uri="{FF2B5EF4-FFF2-40B4-BE49-F238E27FC236}">
-                <a16:creationId xmlns:a16="http://schemas.microsoft.com/office/drawing/2014/main" id="{B538DFB1-8047-4863-BF58-760016D57C6C}"/>
+          <a:p>
+            <a:pPr algn="ctr"/>
+            <a:r>
+              <a:rPr lang="en-US" dirty="0"/>
+              <a:t>(e.g. land cover)</a:t>
+            </a:r>
+          </a:p>
+        </p:txBody>
+      </p:sp>
+      <p:sp>
+        <p:nvSpPr>
+          <p:cNvPr id="13" name="Arrow: Down 12">
+            <a:extLst>
+              <a:ext uri="{FF2B5EF4-FFF2-40B4-BE49-F238E27FC236}">
+                <a16:creationId xmlns:a16="http://schemas.microsoft.com/office/drawing/2014/main" id="{B204DF45-1D72-4A7A-97E5-DB5314A27D53}"/>
               </a:ext>
             </a:extLst>
           </p:cNvPr>
@@ -3577,153 +3618,7 @@
         </p:nvSpPr>
         <p:spPr>
           <a:xfrm>
-            <a:off x="8518847" y="349898"/>
-            <a:ext cx="1713723" cy="998376"/>
-          </a:xfrm>
-          <a:prstGeom prst="roundRect">
-            <a:avLst/>
-          </a:prstGeom>
-        </p:spPr>
-        <p:style>
-          <a:lnRef idx="2">
-            <a:schemeClr val="accent1">
-              <a:shade val="50000"/>
-            </a:schemeClr>
-          </a:lnRef>
-          <a:fillRef idx="1">
-            <a:schemeClr val="accent1"/>
-          </a:fillRef>
-          <a:effectRef idx="0">
-            <a:schemeClr val="accent1"/>
-          </a:effectRef>
-          <a:fontRef idx="minor">
-            <a:schemeClr val="lt1"/>
-          </a:fontRef>
-        </p:style>
-        <p:txBody>
-          <a:bodyPr rtlCol="0" anchor="ctr"/>
-          <a:lstStyle/>
-          <a:p>
-            <a:pPr algn="ctr"/>
-            <a:r>
-              <a:rPr lang="en-US" dirty="0"/>
-              <a:t>10-85 Slope</a:t>
-            </a:r>
-          </a:p>
-        </p:txBody>
-      </p:sp>
-      <p:sp>
-        <p:nvSpPr>
-          <p:cNvPr id="11" name="Rectangle: Rounded Corners 10">
-            <a:extLst>
-              <a:ext uri="{FF2B5EF4-FFF2-40B4-BE49-F238E27FC236}">
-                <a16:creationId xmlns:a16="http://schemas.microsoft.com/office/drawing/2014/main" id="{458265D4-DE6B-4B7D-9B2C-C67B85EB3589}"/>
-              </a:ext>
-            </a:extLst>
-          </p:cNvPr>
-          <p:cNvSpPr/>
-          <p:nvPr/>
-        </p:nvSpPr>
-        <p:spPr>
-          <a:xfrm>
-            <a:off x="10307203" y="349898"/>
-            <a:ext cx="1713723" cy="998376"/>
-          </a:xfrm>
-          <a:prstGeom prst="roundRect">
-            <a:avLst/>
-          </a:prstGeom>
-        </p:spPr>
-        <p:style>
-          <a:lnRef idx="2">
-            <a:schemeClr val="accent1">
-              <a:shade val="50000"/>
-            </a:schemeClr>
-          </a:lnRef>
-          <a:fillRef idx="1">
-            <a:schemeClr val="accent1"/>
-          </a:fillRef>
-          <a:effectRef idx="0">
-            <a:schemeClr val="accent1"/>
-          </a:effectRef>
-          <a:fontRef idx="minor">
-            <a:schemeClr val="lt1"/>
-          </a:fontRef>
-        </p:style>
-        <p:txBody>
-          <a:bodyPr rtlCol="0" anchor="ctr"/>
-          <a:lstStyle/>
-          <a:p>
-            <a:pPr algn="ctr"/>
-            <a:r>
-              <a:rPr lang="en-US" dirty="0"/>
-              <a:t>Others…</a:t>
-            </a:r>
-          </a:p>
-        </p:txBody>
-      </p:sp>
-      <p:sp>
-        <p:nvSpPr>
-          <p:cNvPr id="12" name="Right Brace 11">
-            <a:extLst>
-              <a:ext uri="{FF2B5EF4-FFF2-40B4-BE49-F238E27FC236}">
-                <a16:creationId xmlns:a16="http://schemas.microsoft.com/office/drawing/2014/main" id="{88060509-F85A-4197-929B-E8F86A1262C9}"/>
-              </a:ext>
-            </a:extLst>
-          </p:cNvPr>
-          <p:cNvSpPr/>
-          <p:nvPr/>
-        </p:nvSpPr>
-        <p:spPr>
-          <a:xfrm rot="5400000">
-            <a:off x="8294912" y="-2169365"/>
-            <a:ext cx="326573" cy="7380512"/>
-          </a:xfrm>
-          <a:prstGeom prst="rightBrace">
-            <a:avLst>
-              <a:gd name="adj1" fmla="val 8333"/>
-              <a:gd name="adj2" fmla="val 33487"/>
-            </a:avLst>
-          </a:prstGeom>
-          <a:ln w="38100"/>
-        </p:spPr>
-        <p:style>
-          <a:lnRef idx="1">
-            <a:schemeClr val="accent1"/>
-          </a:lnRef>
-          <a:fillRef idx="0">
-            <a:schemeClr val="accent1"/>
-          </a:fillRef>
-          <a:effectRef idx="0">
-            <a:schemeClr val="accent1"/>
-          </a:effectRef>
-          <a:fontRef idx="minor">
-            <a:schemeClr val="tx1"/>
-          </a:fontRef>
-        </p:style>
-        <p:txBody>
-          <a:bodyPr rtlCol="0" anchor="ctr"/>
-          <a:lstStyle/>
-          <a:p>
-            <a:pPr algn="ctr"/>
-            <a:endParaRPr lang="en-US"/>
-          </a:p>
-        </p:txBody>
-      </p:sp>
-      <p:sp>
-        <p:nvSpPr>
-          <p:cNvPr id="13" name="Arrow: Down 12">
-            <a:extLst>
-              <a:ext uri="{FF2B5EF4-FFF2-40B4-BE49-F238E27FC236}">
-                <a16:creationId xmlns:a16="http://schemas.microsoft.com/office/drawing/2014/main" id="{B204DF45-1D72-4A7A-97E5-DB5314A27D53}"/>
-              </a:ext>
-            </a:extLst>
-          </p:cNvPr>
-          <p:cNvSpPr/>
-          <p:nvPr/>
-        </p:nvSpPr>
-        <p:spPr>
-          <a:xfrm>
-            <a:off x="9395923" y="1968756"/>
+            <a:off x="9974421" y="1455925"/>
             <a:ext cx="578499" cy="382555"/>
           </a:xfrm>
           <a:prstGeom prst="downArrow">
@@ -4121,7 +4016,7 @@
             <a:pPr algn="ctr"/>
             <a:r>
               <a:rPr lang="en-US" b="1" dirty="0"/>
-              <a:t>CPGs</a:t>
+              <a:t>FCPGs</a:t>
             </a:r>
           </a:p>
         </p:txBody>
@@ -4140,8 +4035,8 @@
         </p:nvSpPr>
         <p:spPr>
           <a:xfrm rot="5400000" flipV="1">
-            <a:off x="8622647" y="4990701"/>
-            <a:ext cx="1380930" cy="1167106"/>
+            <a:off x="8899457" y="4713890"/>
+            <a:ext cx="1380930" cy="1720727"/>
           </a:xfrm>
           <a:prstGeom prst="bentUpArrow">
             <a:avLst/>
@@ -4418,7 +4313,7 @@
             </a:pPr>
             <a:r>
               <a:rPr lang="en-US" dirty="0"/>
-              <a:t>Load modules and python env.</a:t>
+              <a:t>Load modules and Python env.</a:t>
             </a:r>
           </a:p>
           <a:p>
@@ -4428,7 +4323,7 @@
             </a:pPr>
             <a:r>
               <a:rPr lang="en-US" dirty="0"/>
-              <a:t>Run the python script that uses the CPG tool.</a:t>
+              <a:t>Run the python script that uses the FCPG tools.</a:t>
             </a:r>
           </a:p>
           <a:p>
@@ -4451,8 +4346,8 @@
         </p:nvSpPr>
         <p:spPr>
           <a:xfrm>
-            <a:off x="4923469" y="1856792"/>
-            <a:ext cx="3442978" cy="1993638"/>
+            <a:off x="4923469" y="2359094"/>
+            <a:ext cx="3442978" cy="1491335"/>
           </a:xfrm>
           <a:prstGeom prst="roundRect">
             <a:avLst/>
@@ -4484,6 +4379,264 @@
               <a:rPr lang="en-US" dirty="0"/>
               <a:t>Check that input and output files/folders exist</a:t>
             </a:r>
+          </a:p>
+        </p:txBody>
+      </p:sp>
+      <p:sp>
+        <p:nvSpPr>
+          <p:cNvPr id="29" name="Rectangle: Rounded Corners 28">
+            <a:extLst>
+              <a:ext uri="{FF2B5EF4-FFF2-40B4-BE49-F238E27FC236}">
+                <a16:creationId xmlns:a16="http://schemas.microsoft.com/office/drawing/2014/main" id="{6D09B8ED-5306-4055-A7CD-858EBA3C4E19}"/>
+              </a:ext>
+            </a:extLst>
+          </p:cNvPr>
+          <p:cNvSpPr/>
+          <p:nvPr/>
+        </p:nvSpPr>
+        <p:spPr>
+          <a:xfrm>
+            <a:off x="8899069" y="3026605"/>
+            <a:ext cx="2628127" cy="667140"/>
+          </a:xfrm>
+          <a:prstGeom prst="roundRect">
+            <a:avLst/>
+          </a:prstGeom>
+        </p:spPr>
+        <p:style>
+          <a:lnRef idx="2">
+            <a:schemeClr val="accent1">
+              <a:shade val="50000"/>
+            </a:schemeClr>
+          </a:lnRef>
+          <a:fillRef idx="1">
+            <a:schemeClr val="accent1"/>
+          </a:fillRef>
+          <a:effectRef idx="0">
+            <a:schemeClr val="accent1"/>
+          </a:effectRef>
+          <a:fontRef idx="minor">
+            <a:schemeClr val="lt1"/>
+          </a:fontRef>
+        </p:style>
+        <p:txBody>
+          <a:bodyPr rtlCol="0" anchor="ctr"/>
+          <a:lstStyle/>
+          <a:p>
+            <a:pPr algn="ctr"/>
+            <a:r>
+              <a:rPr lang="en-US" dirty="0"/>
+              <a:t>Accumulate Parameter</a:t>
+            </a:r>
+          </a:p>
+          <a:p>
+            <a:pPr algn="ctr"/>
+            <a:r>
+              <a:rPr lang="en-US" i="1" dirty="0" err="1"/>
+              <a:t>accumulateParam</a:t>
+            </a:r>
+            <a:r>
+              <a:rPr lang="en-US" i="1" dirty="0"/>
+              <a:t>()</a:t>
+            </a:r>
+          </a:p>
+        </p:txBody>
+      </p:sp>
+      <p:sp>
+        <p:nvSpPr>
+          <p:cNvPr id="30" name="Arrow: Down 29">
+            <a:extLst>
+              <a:ext uri="{FF2B5EF4-FFF2-40B4-BE49-F238E27FC236}">
+                <a16:creationId xmlns:a16="http://schemas.microsoft.com/office/drawing/2014/main" id="{4E0D586A-1270-4421-AF45-AAF766CA65F6}"/>
+              </a:ext>
+            </a:extLst>
+          </p:cNvPr>
+          <p:cNvSpPr/>
+          <p:nvPr/>
+        </p:nvSpPr>
+        <p:spPr>
+          <a:xfrm>
+            <a:off x="9974421" y="2593278"/>
+            <a:ext cx="578498" cy="382555"/>
+          </a:xfrm>
+          <a:prstGeom prst="downArrow">
+            <a:avLst/>
+          </a:prstGeom>
+        </p:spPr>
+        <p:style>
+          <a:lnRef idx="2">
+            <a:schemeClr val="accent6">
+              <a:shade val="50000"/>
+            </a:schemeClr>
+          </a:lnRef>
+          <a:fillRef idx="1">
+            <a:schemeClr val="accent6"/>
+          </a:fillRef>
+          <a:effectRef idx="0">
+            <a:schemeClr val="accent6"/>
+          </a:effectRef>
+          <a:fontRef idx="minor">
+            <a:schemeClr val="lt1"/>
+          </a:fontRef>
+        </p:style>
+        <p:txBody>
+          <a:bodyPr rtlCol="0" anchor="ctr"/>
+          <a:lstStyle/>
+          <a:p>
+            <a:pPr algn="ctr"/>
+            <a:endParaRPr lang="en-US" dirty="0"/>
+          </a:p>
+        </p:txBody>
+      </p:sp>
+      <p:sp>
+        <p:nvSpPr>
+          <p:cNvPr id="31" name="Rectangle: Rounded Corners 30">
+            <a:extLst>
+              <a:ext uri="{FF2B5EF4-FFF2-40B4-BE49-F238E27FC236}">
+                <a16:creationId xmlns:a16="http://schemas.microsoft.com/office/drawing/2014/main" id="{3CBA0CD5-3FCA-40E0-AAAE-EEDA0C28D4CE}"/>
+              </a:ext>
+            </a:extLst>
+          </p:cNvPr>
+          <p:cNvSpPr/>
+          <p:nvPr/>
+        </p:nvSpPr>
+        <p:spPr>
+          <a:xfrm>
+            <a:off x="6874324" y="1253418"/>
+            <a:ext cx="1713723" cy="998376"/>
+          </a:xfrm>
+          <a:prstGeom prst="roundRect">
+            <a:avLst/>
+          </a:prstGeom>
+        </p:spPr>
+        <p:style>
+          <a:lnRef idx="2">
+            <a:schemeClr val="accent1">
+              <a:shade val="50000"/>
+            </a:schemeClr>
+          </a:lnRef>
+          <a:fillRef idx="1">
+            <a:schemeClr val="accent1"/>
+          </a:fillRef>
+          <a:effectRef idx="0">
+            <a:schemeClr val="accent1"/>
+          </a:effectRef>
+          <a:fontRef idx="minor">
+            <a:schemeClr val="lt1"/>
+          </a:fontRef>
+        </p:style>
+        <p:txBody>
+          <a:bodyPr rtlCol="0" anchor="ctr"/>
+          <a:lstStyle/>
+          <a:p>
+            <a:pPr algn="ctr"/>
+            <a:r>
+              <a:rPr lang="en-US" dirty="0"/>
+              <a:t>Make Binary Grids</a:t>
+            </a:r>
+          </a:p>
+          <a:p>
+            <a:pPr algn="ctr"/>
+            <a:r>
+              <a:rPr lang="en-US" i="1" dirty="0"/>
+              <a:t>cat2bin()</a:t>
+            </a:r>
+          </a:p>
+        </p:txBody>
+      </p:sp>
+      <p:sp>
+        <p:nvSpPr>
+          <p:cNvPr id="32" name="Arrow: Bent-Up 31">
+            <a:extLst>
+              <a:ext uri="{FF2B5EF4-FFF2-40B4-BE49-F238E27FC236}">
+                <a16:creationId xmlns:a16="http://schemas.microsoft.com/office/drawing/2014/main" id="{49009208-DC13-434D-A805-73BDF82D3D29}"/>
+              </a:ext>
+            </a:extLst>
+          </p:cNvPr>
+          <p:cNvSpPr/>
+          <p:nvPr/>
+        </p:nvSpPr>
+        <p:spPr>
+          <a:xfrm rot="5400000">
+            <a:off x="5676116" y="889518"/>
+            <a:ext cx="667141" cy="1558205"/>
+          </a:xfrm>
+          <a:prstGeom prst="bentUpArrow">
+            <a:avLst>
+              <a:gd name="adj1" fmla="val 25000"/>
+              <a:gd name="adj2" fmla="val 25676"/>
+              <a:gd name="adj3" fmla="val 27484"/>
+            </a:avLst>
+          </a:prstGeom>
+        </p:spPr>
+        <p:style>
+          <a:lnRef idx="2">
+            <a:schemeClr val="accent6">
+              <a:shade val="50000"/>
+            </a:schemeClr>
+          </a:lnRef>
+          <a:fillRef idx="1">
+            <a:schemeClr val="accent6"/>
+          </a:fillRef>
+          <a:effectRef idx="0">
+            <a:schemeClr val="accent6"/>
+          </a:effectRef>
+          <a:fontRef idx="minor">
+            <a:schemeClr val="lt1"/>
+          </a:fontRef>
+        </p:style>
+        <p:txBody>
+          <a:bodyPr rtlCol="0" anchor="ctr"/>
+          <a:lstStyle/>
+          <a:p>
+            <a:pPr algn="ctr"/>
+            <a:endParaRPr lang="en-US"/>
+          </a:p>
+        </p:txBody>
+      </p:sp>
+      <p:sp>
+        <p:nvSpPr>
+          <p:cNvPr id="33" name="Arrow: Down 32">
+            <a:extLst>
+              <a:ext uri="{FF2B5EF4-FFF2-40B4-BE49-F238E27FC236}">
+                <a16:creationId xmlns:a16="http://schemas.microsoft.com/office/drawing/2014/main" id="{671CEE03-1A03-44F6-BE39-7A5D51C14AA2}"/>
+              </a:ext>
+            </a:extLst>
+          </p:cNvPr>
+          <p:cNvSpPr/>
+          <p:nvPr/>
+        </p:nvSpPr>
+        <p:spPr>
+          <a:xfrm rot="17797425">
+            <a:off x="8584160" y="1933089"/>
+            <a:ext cx="578499" cy="382555"/>
+          </a:xfrm>
+          <a:prstGeom prst="downArrow">
+            <a:avLst/>
+          </a:prstGeom>
+        </p:spPr>
+        <p:style>
+          <a:lnRef idx="2">
+            <a:schemeClr val="accent6">
+              <a:shade val="50000"/>
+            </a:schemeClr>
+          </a:lnRef>
+          <a:fillRef idx="1">
+            <a:schemeClr val="accent6"/>
+          </a:fillRef>
+          <a:effectRef idx="0">
+            <a:schemeClr val="accent6"/>
+          </a:effectRef>
+          <a:fontRef idx="minor">
+            <a:schemeClr val="lt1"/>
+          </a:fontRef>
+        </p:style>
+        <p:txBody>
+          <a:bodyPr rtlCol="0" anchor="ctr"/>
+          <a:lstStyle/>
+          <a:p>
+            <a:pPr algn="ctr"/>
+            <a:endParaRPr lang="en-US"/>
           </a:p>
         </p:txBody>
       </p:sp>

</xml_diff>